<commit_message>
server added and p5 adjusments
</commit_message>
<xml_diff>
--- a/Documents/Mood Picture - Second presentation.pptx
+++ b/Documents/Mood Picture - Second presentation.pptx
@@ -249,7 +249,7 @@
           <a:p>
             <a:fld id="{9EA66E64-07EC-4BAA-9F85-F56BD96B36B0}" type="datetimeFigureOut">
               <a:rPr lang="pt-PT" smtClean="0"/>
-              <a:t>22/11/2021</a:t>
+              <a:t>25/11/2021</a:t>
             </a:fld>
             <a:endParaRPr lang="pt-PT"/>
           </a:p>
@@ -536,7 +536,7 @@
           <a:p>
             <a:fld id="{9EA66E64-07EC-4BAA-9F85-F56BD96B36B0}" type="datetimeFigureOut">
               <a:rPr lang="pt-PT" smtClean="0"/>
-              <a:t>22/11/2021</a:t>
+              <a:t>25/11/2021</a:t>
             </a:fld>
             <a:endParaRPr lang="pt-PT"/>
           </a:p>
@@ -728,7 +728,7 @@
           <a:p>
             <a:fld id="{9EA66E64-07EC-4BAA-9F85-F56BD96B36B0}" type="datetimeFigureOut">
               <a:rPr lang="pt-PT" smtClean="0"/>
-              <a:t>22/11/2021</a:t>
+              <a:t>25/11/2021</a:t>
             </a:fld>
             <a:endParaRPr lang="pt-PT"/>
           </a:p>
@@ -989,7 +989,7 @@
           <a:p>
             <a:fld id="{9EA66E64-07EC-4BAA-9F85-F56BD96B36B0}" type="datetimeFigureOut">
               <a:rPr lang="pt-PT" smtClean="0"/>
-              <a:t>22/11/2021</a:t>
+              <a:t>25/11/2021</a:t>
             </a:fld>
             <a:endParaRPr lang="pt-PT"/>
           </a:p>
@@ -1413,7 +1413,7 @@
           <a:p>
             <a:fld id="{9EA66E64-07EC-4BAA-9F85-F56BD96B36B0}" type="datetimeFigureOut">
               <a:rPr lang="pt-PT" smtClean="0"/>
-              <a:t>22/11/2021</a:t>
+              <a:t>25/11/2021</a:t>
             </a:fld>
             <a:endParaRPr lang="pt-PT"/>
           </a:p>
@@ -1959,7 +1959,7 @@
           <a:p>
             <a:fld id="{9EA66E64-07EC-4BAA-9F85-F56BD96B36B0}" type="datetimeFigureOut">
               <a:rPr lang="pt-PT" smtClean="0"/>
-              <a:t>22/11/2021</a:t>
+              <a:t>25/11/2021</a:t>
             </a:fld>
             <a:endParaRPr lang="pt-PT"/>
           </a:p>
@@ -2799,7 +2799,7 @@
           <a:p>
             <a:fld id="{9EA66E64-07EC-4BAA-9F85-F56BD96B36B0}" type="datetimeFigureOut">
               <a:rPr lang="pt-PT" smtClean="0"/>
-              <a:t>22/11/2021</a:t>
+              <a:t>25/11/2021</a:t>
             </a:fld>
             <a:endParaRPr lang="pt-PT"/>
           </a:p>
@@ -2969,7 +2969,7 @@
           <a:p>
             <a:fld id="{9EA66E64-07EC-4BAA-9F85-F56BD96B36B0}" type="datetimeFigureOut">
               <a:rPr lang="pt-PT" smtClean="0"/>
-              <a:t>22/11/2021</a:t>
+              <a:t>25/11/2021</a:t>
             </a:fld>
             <a:endParaRPr lang="pt-PT"/>
           </a:p>
@@ -3153,7 +3153,7 @@
           <a:p>
             <a:fld id="{9EA66E64-07EC-4BAA-9F85-F56BD96B36B0}" type="datetimeFigureOut">
               <a:rPr lang="pt-PT" smtClean="0"/>
-              <a:t>22/11/2021</a:t>
+              <a:t>25/11/2021</a:t>
             </a:fld>
             <a:endParaRPr lang="pt-PT"/>
           </a:p>
@@ -3323,7 +3323,7 @@
           <a:p>
             <a:fld id="{9EA66E64-07EC-4BAA-9F85-F56BD96B36B0}" type="datetimeFigureOut">
               <a:rPr lang="pt-PT" smtClean="0"/>
-              <a:t>22/11/2021</a:t>
+              <a:t>25/11/2021</a:t>
             </a:fld>
             <a:endParaRPr lang="pt-PT"/>
           </a:p>
@@ -3571,7 +3571,7 @@
           <a:p>
             <a:fld id="{9EA66E64-07EC-4BAA-9F85-F56BD96B36B0}" type="datetimeFigureOut">
               <a:rPr lang="pt-PT" smtClean="0"/>
-              <a:t>22/11/2021</a:t>
+              <a:t>25/11/2021</a:t>
             </a:fld>
             <a:endParaRPr lang="pt-PT"/>
           </a:p>
@@ -3808,7 +3808,7 @@
           <a:p>
             <a:fld id="{9EA66E64-07EC-4BAA-9F85-F56BD96B36B0}" type="datetimeFigureOut">
               <a:rPr lang="pt-PT" smtClean="0"/>
-              <a:t>22/11/2021</a:t>
+              <a:t>25/11/2021</a:t>
             </a:fld>
             <a:endParaRPr lang="pt-PT"/>
           </a:p>
@@ -4181,7 +4181,7 @@
           <a:p>
             <a:fld id="{9EA66E64-07EC-4BAA-9F85-F56BD96B36B0}" type="datetimeFigureOut">
               <a:rPr lang="pt-PT" smtClean="0"/>
-              <a:t>22/11/2021</a:t>
+              <a:t>25/11/2021</a:t>
             </a:fld>
             <a:endParaRPr lang="pt-PT"/>
           </a:p>
@@ -4299,7 +4299,7 @@
           <a:p>
             <a:fld id="{9EA66E64-07EC-4BAA-9F85-F56BD96B36B0}" type="datetimeFigureOut">
               <a:rPr lang="pt-PT" smtClean="0"/>
-              <a:t>22/11/2021</a:t>
+              <a:t>25/11/2021</a:t>
             </a:fld>
             <a:endParaRPr lang="pt-PT"/>
           </a:p>
@@ -4394,7 +4394,7 @@
           <a:p>
             <a:fld id="{9EA66E64-07EC-4BAA-9F85-F56BD96B36B0}" type="datetimeFigureOut">
               <a:rPr lang="pt-PT" smtClean="0"/>
-              <a:t>22/11/2021</a:t>
+              <a:t>25/11/2021</a:t>
             </a:fld>
             <a:endParaRPr lang="pt-PT"/>
           </a:p>
@@ -4645,7 +4645,7 @@
           <a:p>
             <a:fld id="{9EA66E64-07EC-4BAA-9F85-F56BD96B36B0}" type="datetimeFigureOut">
               <a:rPr lang="pt-PT" smtClean="0"/>
-              <a:t>22/11/2021</a:t>
+              <a:t>25/11/2021</a:t>
             </a:fld>
             <a:endParaRPr lang="pt-PT"/>
           </a:p>
@@ -4932,7 +4932,7 @@
           <a:p>
             <a:fld id="{9EA66E64-07EC-4BAA-9F85-F56BD96B36B0}" type="datetimeFigureOut">
               <a:rPr lang="pt-PT" smtClean="0"/>
-              <a:t>22/11/2021</a:t>
+              <a:t>25/11/2021</a:t>
             </a:fld>
             <a:endParaRPr lang="pt-PT"/>
           </a:p>
@@ -5145,7 +5145,7 @@
           <a:p>
             <a:fld id="{9EA66E64-07EC-4BAA-9F85-F56BD96B36B0}" type="datetimeFigureOut">
               <a:rPr lang="pt-PT" smtClean="0"/>
-              <a:t>22/11/2021</a:t>
+              <a:t>25/11/2021</a:t>
             </a:fld>
             <a:endParaRPr lang="pt-PT"/>
           </a:p>

</xml_diff>

<commit_message>
Update Mood Picture - Second presentation.pptx
</commit_message>
<xml_diff>
--- a/Documents/Mood Picture - Second presentation.pptx
+++ b/Documents/Mood Picture - Second presentation.pptx
@@ -1733,7 +1733,7 @@
         <a:p>
           <a:r>
             <a:rPr lang="en-GB" dirty="0"/>
-            <a:t>User inform their perception on a form.</a:t>
+            <a:t>User inform their mood perception on a form.</a:t>
           </a:r>
         </a:p>
       </dgm:t>
@@ -2025,12 +2025,12 @@
         </a:fontRef>
       </dsp:style>
       <dsp:txBody>
-        <a:bodyPr spcFirstLastPara="0" vert="horz" wrap="square" lIns="80010" tIns="80010" rIns="80010" bIns="80010" numCol="1" spcCol="1270" anchor="ctr" anchorCtr="0">
+        <a:bodyPr spcFirstLastPara="0" vert="horz" wrap="square" lIns="72390" tIns="72390" rIns="72390" bIns="72390" numCol="1" spcCol="1270" anchor="ctr" anchorCtr="0">
           <a:noAutofit/>
         </a:bodyPr>
         <a:lstStyle/>
         <a:p>
-          <a:pPr marL="0" lvl="0" indent="0" algn="ctr" defTabSz="933450">
+          <a:pPr marL="0" lvl="0" indent="0" algn="ctr" defTabSz="844550">
             <a:lnSpc>
               <a:spcPct val="90000"/>
             </a:lnSpc>
@@ -2043,7 +2043,7 @@
             <a:buNone/>
           </a:pPr>
           <a:r>
-            <a:rPr lang="en-GB" sz="2100" kern="1200" dirty="0"/>
+            <a:rPr lang="en-GB" sz="1900" kern="1200" dirty="0"/>
             <a:t>User turn on the sensor.</a:t>
           </a:r>
         </a:p>
@@ -2103,7 +2103,7 @@
         </a:bodyPr>
         <a:lstStyle/>
         <a:p>
-          <a:pPr marL="0" lvl="0" indent="0" algn="ctr" defTabSz="755650">
+          <a:pPr marL="0" lvl="0" indent="0" algn="ctr" defTabSz="666750">
             <a:lnSpc>
               <a:spcPct val="90000"/>
             </a:lnSpc>
@@ -2115,7 +2115,7 @@
             </a:spcAft>
             <a:buNone/>
           </a:pPr>
-          <a:endParaRPr lang="en-GB" sz="1700" kern="1200"/>
+          <a:endParaRPr lang="en-GB" sz="1500" kern="1200"/>
         </a:p>
       </dsp:txBody>
       <dsp:txXfrm>
@@ -2175,12 +2175,12 @@
         </a:fontRef>
       </dsp:style>
       <dsp:txBody>
-        <a:bodyPr spcFirstLastPara="0" vert="horz" wrap="square" lIns="80010" tIns="80010" rIns="80010" bIns="80010" numCol="1" spcCol="1270" anchor="ctr" anchorCtr="0">
+        <a:bodyPr spcFirstLastPara="0" vert="horz" wrap="square" lIns="72390" tIns="72390" rIns="72390" bIns="72390" numCol="1" spcCol="1270" anchor="ctr" anchorCtr="0">
           <a:noAutofit/>
         </a:bodyPr>
         <a:lstStyle/>
         <a:p>
-          <a:pPr marL="0" lvl="0" indent="0" algn="ctr" defTabSz="933450">
+          <a:pPr marL="0" lvl="0" indent="0" algn="ctr" defTabSz="844550">
             <a:lnSpc>
               <a:spcPct val="90000"/>
             </a:lnSpc>
@@ -2193,7 +2193,7 @@
             <a:buNone/>
           </a:pPr>
           <a:r>
-            <a:rPr lang="en-GB" sz="2100" kern="1200" dirty="0"/>
+            <a:rPr lang="en-GB" sz="1900" kern="1200" dirty="0"/>
             <a:t>User turn off the sensor.</a:t>
           </a:r>
         </a:p>
@@ -2253,7 +2253,7 @@
         </a:bodyPr>
         <a:lstStyle/>
         <a:p>
-          <a:pPr marL="0" lvl="0" indent="0" algn="ctr" defTabSz="755650">
+          <a:pPr marL="0" lvl="0" indent="0" algn="ctr" defTabSz="666750">
             <a:lnSpc>
               <a:spcPct val="90000"/>
             </a:lnSpc>
@@ -2265,7 +2265,7 @@
             </a:spcAft>
             <a:buNone/>
           </a:pPr>
-          <a:endParaRPr lang="en-GB" sz="1700" kern="1200"/>
+          <a:endParaRPr lang="en-GB" sz="1500" kern="1200"/>
         </a:p>
       </dsp:txBody>
       <dsp:txXfrm>
@@ -2325,12 +2325,12 @@
         </a:fontRef>
       </dsp:style>
       <dsp:txBody>
-        <a:bodyPr spcFirstLastPara="0" vert="horz" wrap="square" lIns="80010" tIns="80010" rIns="80010" bIns="80010" numCol="1" spcCol="1270" anchor="ctr" anchorCtr="0">
+        <a:bodyPr spcFirstLastPara="0" vert="horz" wrap="square" lIns="72390" tIns="72390" rIns="72390" bIns="72390" numCol="1" spcCol="1270" anchor="ctr" anchorCtr="0">
           <a:noAutofit/>
         </a:bodyPr>
         <a:lstStyle/>
         <a:p>
-          <a:pPr marL="0" lvl="0" indent="0" algn="ctr" defTabSz="933450">
+          <a:pPr marL="0" lvl="0" indent="0" algn="ctr" defTabSz="844550">
             <a:lnSpc>
               <a:spcPct val="90000"/>
             </a:lnSpc>
@@ -2343,8 +2343,8 @@
             <a:buNone/>
           </a:pPr>
           <a:r>
-            <a:rPr lang="en-GB" sz="2100" kern="1200" dirty="0"/>
-            <a:t>User inform their perception on a form.</a:t>
+            <a:rPr lang="en-GB" sz="1900" kern="1200" dirty="0"/>
+            <a:t>User inform their mood perception on a form.</a:t>
           </a:r>
         </a:p>
       </dsp:txBody>
@@ -2403,7 +2403,7 @@
         </a:bodyPr>
         <a:lstStyle/>
         <a:p>
-          <a:pPr marL="0" lvl="0" indent="0" algn="ctr" defTabSz="755650">
+          <a:pPr marL="0" lvl="0" indent="0" algn="ctr" defTabSz="666750">
             <a:lnSpc>
               <a:spcPct val="90000"/>
             </a:lnSpc>
@@ -2415,7 +2415,7 @@
             </a:spcAft>
             <a:buNone/>
           </a:pPr>
-          <a:endParaRPr lang="en-GB" sz="1700" kern="1200"/>
+          <a:endParaRPr lang="en-GB" sz="1500" kern="1200"/>
         </a:p>
       </dsp:txBody>
       <dsp:txXfrm>
@@ -2475,12 +2475,12 @@
         </a:fontRef>
       </dsp:style>
       <dsp:txBody>
-        <a:bodyPr spcFirstLastPara="0" vert="horz" wrap="square" lIns="80010" tIns="80010" rIns="80010" bIns="80010" numCol="1" spcCol="1270" anchor="ctr" anchorCtr="0">
+        <a:bodyPr spcFirstLastPara="0" vert="horz" wrap="square" lIns="72390" tIns="72390" rIns="72390" bIns="72390" numCol="1" spcCol="1270" anchor="ctr" anchorCtr="0">
           <a:noAutofit/>
         </a:bodyPr>
         <a:lstStyle/>
         <a:p>
-          <a:pPr marL="0" lvl="0" indent="0" algn="ctr" defTabSz="933450">
+          <a:pPr marL="0" lvl="0" indent="0" algn="ctr" defTabSz="844550">
             <a:lnSpc>
               <a:spcPct val="90000"/>
             </a:lnSpc>
@@ -2493,7 +2493,7 @@
             <a:buNone/>
           </a:pPr>
           <a:r>
-            <a:rPr lang="en-GB" sz="2100" kern="1200" dirty="0"/>
+            <a:rPr lang="en-GB" sz="1900" kern="1200" dirty="0"/>
             <a:t>The animation is generated and shown.</a:t>
           </a:r>
         </a:p>
@@ -5012,7 +5012,7 @@
           <a:p>
             <a:fld id="{9EA66E64-07EC-4BAA-9F85-F56BD96B36B0}" type="datetimeFigureOut">
               <a:rPr lang="pt-PT" smtClean="0"/>
-              <a:t>27/11/2021</a:t>
+              <a:t>29/11/2021</a:t>
             </a:fld>
             <a:endParaRPr lang="pt-PT"/>
           </a:p>
@@ -5299,7 +5299,7 @@
           <a:p>
             <a:fld id="{9EA66E64-07EC-4BAA-9F85-F56BD96B36B0}" type="datetimeFigureOut">
               <a:rPr lang="pt-PT" smtClean="0"/>
-              <a:t>27/11/2021</a:t>
+              <a:t>29/11/2021</a:t>
             </a:fld>
             <a:endParaRPr lang="pt-PT"/>
           </a:p>
@@ -5491,7 +5491,7 @@
           <a:p>
             <a:fld id="{9EA66E64-07EC-4BAA-9F85-F56BD96B36B0}" type="datetimeFigureOut">
               <a:rPr lang="pt-PT" smtClean="0"/>
-              <a:t>27/11/2021</a:t>
+              <a:t>29/11/2021</a:t>
             </a:fld>
             <a:endParaRPr lang="pt-PT"/>
           </a:p>
@@ -5752,7 +5752,7 @@
           <a:p>
             <a:fld id="{9EA66E64-07EC-4BAA-9F85-F56BD96B36B0}" type="datetimeFigureOut">
               <a:rPr lang="pt-PT" smtClean="0"/>
-              <a:t>27/11/2021</a:t>
+              <a:t>29/11/2021</a:t>
             </a:fld>
             <a:endParaRPr lang="pt-PT"/>
           </a:p>
@@ -6176,7 +6176,7 @@
           <a:p>
             <a:fld id="{9EA66E64-07EC-4BAA-9F85-F56BD96B36B0}" type="datetimeFigureOut">
               <a:rPr lang="pt-PT" smtClean="0"/>
-              <a:t>27/11/2021</a:t>
+              <a:t>29/11/2021</a:t>
             </a:fld>
             <a:endParaRPr lang="pt-PT"/>
           </a:p>
@@ -6722,7 +6722,7 @@
           <a:p>
             <a:fld id="{9EA66E64-07EC-4BAA-9F85-F56BD96B36B0}" type="datetimeFigureOut">
               <a:rPr lang="pt-PT" smtClean="0"/>
-              <a:t>27/11/2021</a:t>
+              <a:t>29/11/2021</a:t>
             </a:fld>
             <a:endParaRPr lang="pt-PT"/>
           </a:p>
@@ -7562,7 +7562,7 @@
           <a:p>
             <a:fld id="{9EA66E64-07EC-4BAA-9F85-F56BD96B36B0}" type="datetimeFigureOut">
               <a:rPr lang="pt-PT" smtClean="0"/>
-              <a:t>27/11/2021</a:t>
+              <a:t>29/11/2021</a:t>
             </a:fld>
             <a:endParaRPr lang="pt-PT"/>
           </a:p>
@@ -7732,7 +7732,7 @@
           <a:p>
             <a:fld id="{9EA66E64-07EC-4BAA-9F85-F56BD96B36B0}" type="datetimeFigureOut">
               <a:rPr lang="pt-PT" smtClean="0"/>
-              <a:t>27/11/2021</a:t>
+              <a:t>29/11/2021</a:t>
             </a:fld>
             <a:endParaRPr lang="pt-PT"/>
           </a:p>
@@ -7916,7 +7916,7 @@
           <a:p>
             <a:fld id="{9EA66E64-07EC-4BAA-9F85-F56BD96B36B0}" type="datetimeFigureOut">
               <a:rPr lang="pt-PT" smtClean="0"/>
-              <a:t>27/11/2021</a:t>
+              <a:t>29/11/2021</a:t>
             </a:fld>
             <a:endParaRPr lang="pt-PT"/>
           </a:p>
@@ -8086,7 +8086,7 @@
           <a:p>
             <a:fld id="{9EA66E64-07EC-4BAA-9F85-F56BD96B36B0}" type="datetimeFigureOut">
               <a:rPr lang="pt-PT" smtClean="0"/>
-              <a:t>27/11/2021</a:t>
+              <a:t>29/11/2021</a:t>
             </a:fld>
             <a:endParaRPr lang="pt-PT"/>
           </a:p>
@@ -8334,7 +8334,7 @@
           <a:p>
             <a:fld id="{9EA66E64-07EC-4BAA-9F85-F56BD96B36B0}" type="datetimeFigureOut">
               <a:rPr lang="pt-PT" smtClean="0"/>
-              <a:t>27/11/2021</a:t>
+              <a:t>29/11/2021</a:t>
             </a:fld>
             <a:endParaRPr lang="pt-PT"/>
           </a:p>
@@ -8571,7 +8571,7 @@
           <a:p>
             <a:fld id="{9EA66E64-07EC-4BAA-9F85-F56BD96B36B0}" type="datetimeFigureOut">
               <a:rPr lang="pt-PT" smtClean="0"/>
-              <a:t>27/11/2021</a:t>
+              <a:t>29/11/2021</a:t>
             </a:fld>
             <a:endParaRPr lang="pt-PT"/>
           </a:p>
@@ -8944,7 +8944,7 @@
           <a:p>
             <a:fld id="{9EA66E64-07EC-4BAA-9F85-F56BD96B36B0}" type="datetimeFigureOut">
               <a:rPr lang="pt-PT" smtClean="0"/>
-              <a:t>27/11/2021</a:t>
+              <a:t>29/11/2021</a:t>
             </a:fld>
             <a:endParaRPr lang="pt-PT"/>
           </a:p>
@@ -9062,7 +9062,7 @@
           <a:p>
             <a:fld id="{9EA66E64-07EC-4BAA-9F85-F56BD96B36B0}" type="datetimeFigureOut">
               <a:rPr lang="pt-PT" smtClean="0"/>
-              <a:t>27/11/2021</a:t>
+              <a:t>29/11/2021</a:t>
             </a:fld>
             <a:endParaRPr lang="pt-PT"/>
           </a:p>
@@ -9157,7 +9157,7 @@
           <a:p>
             <a:fld id="{9EA66E64-07EC-4BAA-9F85-F56BD96B36B0}" type="datetimeFigureOut">
               <a:rPr lang="pt-PT" smtClean="0"/>
-              <a:t>27/11/2021</a:t>
+              <a:t>29/11/2021</a:t>
             </a:fld>
             <a:endParaRPr lang="pt-PT"/>
           </a:p>
@@ -9408,7 +9408,7 @@
           <a:p>
             <a:fld id="{9EA66E64-07EC-4BAA-9F85-F56BD96B36B0}" type="datetimeFigureOut">
               <a:rPr lang="pt-PT" smtClean="0"/>
-              <a:t>27/11/2021</a:t>
+              <a:t>29/11/2021</a:t>
             </a:fld>
             <a:endParaRPr lang="pt-PT"/>
           </a:p>
@@ -9695,7 +9695,7 @@
           <a:p>
             <a:fld id="{9EA66E64-07EC-4BAA-9F85-F56BD96B36B0}" type="datetimeFigureOut">
               <a:rPr lang="pt-PT" smtClean="0"/>
-              <a:t>27/11/2021</a:t>
+              <a:t>29/11/2021</a:t>
             </a:fld>
             <a:endParaRPr lang="pt-PT"/>
           </a:p>
@@ -9908,7 +9908,7 @@
           <a:p>
             <a:fld id="{9EA66E64-07EC-4BAA-9F85-F56BD96B36B0}" type="datetimeFigureOut">
               <a:rPr lang="pt-PT" smtClean="0"/>
-              <a:t>27/11/2021</a:t>
+              <a:t>29/11/2021</a:t>
             </a:fld>
             <a:endParaRPr lang="pt-PT"/>
           </a:p>
@@ -12045,7 +12045,7 @@
         <p:spPr/>
         <p:txBody>
           <a:bodyPr>
-            <a:normAutofit lnSpcReduction="10000"/>
+            <a:normAutofit/>
           </a:bodyPr>
           <a:lstStyle/>
           <a:p>
@@ -12057,7 +12057,7 @@
           <a:p>
             <a:r>
               <a:rPr lang="en-GB" sz="2800" dirty="0"/>
-              <a:t>People tend to not be aware of the stress level raise on the environment they are in, so it’ll be interesting to make people reflect about a visual representation of the sound intermittency during the day.</a:t>
+              <a:t>People tend to not be aware of the stress level raise on the environment they are in, so it’ll be interesting to make people reflect about a visual representation of the sounds patterns.</a:t>
             </a:r>
           </a:p>
         </p:txBody>
@@ -12333,7 +12333,7 @@
             <p:ph idx="1"/>
             <p:extLst>
               <p:ext uri="{D42A27DB-BD31-4B8C-83A1-F6EECF244321}">
-                <p14:modId xmlns:p14="http://schemas.microsoft.com/office/powerpoint/2010/main" val="3901328122"/>
+                <p14:modId xmlns:p14="http://schemas.microsoft.com/office/powerpoint/2010/main" val="86247400"/>
               </p:ext>
             </p:extLst>
           </p:nvPr>
@@ -12437,6 +12437,56 @@
           </a:graphicData>
         </a:graphic>
       </p:graphicFrame>
+      <p:sp>
+        <p:nvSpPr>
+          <p:cNvPr id="3" name="Rectangle: Rounded Corners 2">
+            <a:extLst>
+              <a:ext uri="{FF2B5EF4-FFF2-40B4-BE49-F238E27FC236}">
+                <a16:creationId xmlns:a16="http://schemas.microsoft.com/office/drawing/2014/main" id="{B2F8F299-351D-4DF7-B474-F97629046AD4}"/>
+              </a:ext>
+            </a:extLst>
+          </p:cNvPr>
+          <p:cNvSpPr/>
+          <p:nvPr/>
+        </p:nvSpPr>
+        <p:spPr>
+          <a:xfrm>
+            <a:off x="1305611" y="1935921"/>
+            <a:ext cx="9570128" cy="4518145"/>
+          </a:xfrm>
+          <a:prstGeom prst="roundRect">
+            <a:avLst/>
+          </a:prstGeom>
+          <a:solidFill>
+            <a:schemeClr val="bg2">
+              <a:lumMod val="20000"/>
+              <a:lumOff val="80000"/>
+            </a:schemeClr>
+          </a:solidFill>
+        </p:spPr>
+        <p:style>
+          <a:lnRef idx="2">
+            <a:schemeClr val="dk1"/>
+          </a:lnRef>
+          <a:fillRef idx="1">
+            <a:schemeClr val="lt1"/>
+          </a:fillRef>
+          <a:effectRef idx="0">
+            <a:schemeClr val="dk1"/>
+          </a:effectRef>
+          <a:fontRef idx="minor">
+            <a:schemeClr val="dk1"/>
+          </a:fontRef>
+        </p:style>
+        <p:txBody>
+          <a:bodyPr rtlCol="0" anchor="ctr"/>
+          <a:lstStyle/>
+          <a:p>
+            <a:pPr algn="ctr"/>
+            <a:endParaRPr lang="en-GB"/>
+          </a:p>
+        </p:txBody>
+      </p:sp>
       <p:pic>
         <p:nvPicPr>
           <p:cNvPr id="7" name="Picture 6">
@@ -12465,7 +12515,7 @@
         </p:blipFill>
         <p:spPr>
           <a:xfrm>
-            <a:off x="2202378" y="2228270"/>
+            <a:off x="2202378" y="2361040"/>
             <a:ext cx="7776594" cy="3430160"/>
           </a:xfrm>
           <a:prstGeom prst="rect">

</xml_diff>